<commit_message>
Added ability to pull from data set
</commit_message>
<xml_diff>
--- a/destPPTX.pptx
+++ b/destPPTX.pptx
@@ -5,14 +5,8 @@
     <p:sldMasterId id="2147483660" r:id="rId1"/>
   </p:sldMasterIdLst>
   <p:sldIdLst>
-    <p:sldId id="256" r:id="rId6"/>
-    <p:sldId id="257" r:id="rId7"/>
-    <p:sldId id="258" r:id="rId8"/>
-    <p:sldId id="259" r:id="rId9"/>
-    <p:sldId id="260" r:id="rId10"/>
-    <p:sldId id="261" r:id="rId11"/>
-    <p:sldId id="262" r:id="rId12"/>
-    <p:sldId id="263" r:id="rId13"/>
+    <p:sldId id="256" r:id="rId2"/>
+    <p:sldId id="257" r:id="rId3"/>
   </p:sldIdLst>
   <p:sldSz cx="6858000" cy="9144000" type="letter"/>
   <p:notesSz cx="6858000" cy="9144000"/>
@@ -547,7 +541,7 @@
 </file>
 
 <file path=ppt/slideLayouts/slideLayout3.xml><?xml version="1.0" encoding="utf-8"?>
-<p:sldLayout xmlns:a="http://schemas.openxmlformats.org/drawingml/2006/main" xmlns:r="http://schemas.openxmlformats.org/officeDocument/2006/relationships" xmlns:p="http://schemas.openxmlformats.org/presentationml/2006/main" preserve="1" userDrawn="1">
+<p:sldLayout xmlns:a="http://schemas.openxmlformats.org/drawingml/2006/main" xmlns:r="http://schemas.openxmlformats.org/officeDocument/2006/relationships" xmlns:p="http://schemas.openxmlformats.org/presentationml/2006/main" showMasterSp="0" preserve="1" userDrawn="1">
   <p:cSld name="1_Title and Content">
     <p:spTree>
       <p:nvGrpSpPr>
@@ -565,29 +559,6 @@
       </p:grpSpPr>
       <p:sp>
         <p:nvSpPr>
-          <p:cNvPr id="2" name="Title 1"/>
-          <p:cNvSpPr>
-            <a:spLocks noGrp="1"/>
-          </p:cNvSpPr>
-          <p:nvPr>
-            <p:ph type="title"/>
-          </p:nvPr>
-        </p:nvSpPr>
-        <p:spPr/>
-        <p:txBody>
-          <a:bodyPr/>
-          <a:lstStyle/>
-          <a:p>
-            <a:r>
-              <a:rPr lang="en-US"/>
-              <a:t>Click to edit Master title style</a:t>
-            </a:r>
-            <a:endParaRPr lang="en-US" dirty="0"/>
-          </a:p>
-        </p:txBody>
-      </p:sp>
-      <p:sp>
-        <p:nvSpPr>
           <p:cNvPr id="3" name="Content Placeholder 2"/>
           <p:cNvSpPr>
             <a:spLocks noGrp="1"/>
@@ -598,7 +569,7 @@
         </p:nvSpPr>
         <p:spPr>
           <a:xfrm>
-            <a:off x="228600" y="1120410"/>
+            <a:off x="233923" y="1468642"/>
             <a:ext cx="3112129" cy="2686171"/>
           </a:xfrm>
         </p:spPr>
@@ -740,7 +711,7 @@
         </p:nvSpPr>
         <p:spPr>
           <a:xfrm>
-            <a:off x="228599" y="843411"/>
+            <a:off x="233922" y="1191643"/>
             <a:ext cx="3112129" cy="276999"/>
           </a:xfrm>
           <a:prstGeom prst="rect">
@@ -775,8 +746,8 @@
         </p:nvSpPr>
         <p:spPr>
           <a:xfrm>
-            <a:off x="3511612" y="843410"/>
-            <a:ext cx="686433" cy="276999"/>
+            <a:off x="2437016" y="-5068"/>
+            <a:ext cx="1828800" cy="169277"/>
           </a:xfrm>
           <a:prstGeom prst="rect">
             <a:avLst/>
@@ -785,13 +756,13 @@
         </p:spPr>
         <p:txBody>
           <a:bodyPr wrap="square" lIns="0" tIns="0" rIns="0" bIns="0" rtlCol="0">
-            <a:spAutoFit/>
+            <a:noAutofit/>
           </a:bodyPr>
           <a:lstStyle/>
           <a:p>
             <a:r>
-              <a:rPr lang="en-US" dirty="0"/>
-              <a:t>Status:</a:t>
+              <a:rPr lang="en-US" sz="1100" dirty="0"/>
+              <a:t>Status</a:t>
             </a:r>
           </a:p>
         </p:txBody>
@@ -814,16 +785,24 @@
         </p:nvSpPr>
         <p:spPr>
           <a:xfrm>
-            <a:off x="4254500" y="843003"/>
-            <a:ext cx="2374900" cy="277812"/>
-          </a:xfrm>
-        </p:spPr>
-        <p:txBody>
-          <a:bodyPr>
+            <a:off x="2421295" y="137160"/>
+            <a:ext cx="2011680" cy="274320"/>
+          </a:xfrm>
+          <a:ln>
+            <a:solidFill>
+              <a:schemeClr val="accent1">
+                <a:lumMod val="60000"/>
+                <a:lumOff val="40000"/>
+              </a:schemeClr>
+            </a:solidFill>
+          </a:ln>
+        </p:spPr>
+        <p:txBody>
+          <a:bodyPr lIns="91440" tIns="0" rIns="91440" bIns="0" anchor="ctr">
             <a:noAutofit/>
           </a:bodyPr>
           <a:lstStyle>
-            <a:lvl1pPr marL="0" indent="0">
+            <a:lvl1pPr marL="0" indent="0" algn="ctr">
               <a:buNone/>
               <a:defRPr sz="1800"/>
             </a:lvl1pPr>
@@ -855,9 +834,101 @@
         </p:nvSpPr>
         <p:spPr>
           <a:xfrm>
-            <a:off x="3506732" y="1624065"/>
-            <a:ext cx="1001626" cy="277812"/>
-          </a:xfrm>
+            <a:off x="3501413" y="1474877"/>
+            <a:ext cx="1001626" cy="580465"/>
+          </a:xfrm>
+          <a:ln>
+            <a:solidFill>
+              <a:schemeClr val="accent1">
+                <a:lumMod val="60000"/>
+                <a:lumOff val="40000"/>
+              </a:schemeClr>
+            </a:solidFill>
+          </a:ln>
+        </p:spPr>
+        <p:txBody>
+          <a:bodyPr tIns="365760" bIns="365760" anchor="ctr">
+            <a:noAutofit/>
+          </a:bodyPr>
+          <a:lstStyle>
+            <a:lvl1pPr marL="0" indent="0" algn="ctr">
+              <a:buNone/>
+              <a:defRPr sz="1200"/>
+            </a:lvl1pPr>
+          </a:lstStyle>
+          <a:p>
+            <a:pPr lvl="0"/>
+            <a:r>
+              <a:rPr lang="en-US"/>
+              <a:t>Click to edit Master text styles</a:t>
+            </a:r>
+          </a:p>
+        </p:txBody>
+      </p:sp>
+      <p:sp>
+        <p:nvSpPr>
+          <p:cNvPr id="19" name="TextBox 18">
+            <a:extLst>
+              <a:ext uri="{FF2B5EF4-FFF2-40B4-BE49-F238E27FC236}">
+                <a16:creationId xmlns:a16="http://schemas.microsoft.com/office/drawing/2014/main" id="{A1C797A5-B3D3-5B44-9B35-69FA783DEB68}"/>
+              </a:ext>
+            </a:extLst>
+          </p:cNvPr>
+          <p:cNvSpPr txBox="1"/>
+          <p:nvPr userDrawn="1"/>
+        </p:nvSpPr>
+        <p:spPr>
+          <a:xfrm>
+            <a:off x="3453838" y="2051363"/>
+            <a:ext cx="1096775" cy="215444"/>
+          </a:xfrm>
+          <a:prstGeom prst="rect">
+            <a:avLst/>
+          </a:prstGeom>
+          <a:noFill/>
+        </p:spPr>
+        <p:txBody>
+          <a:bodyPr wrap="none" rtlCol="0">
+            <a:spAutoFit/>
+          </a:bodyPr>
+          <a:lstStyle/>
+          <a:p>
+            <a:r>
+              <a:rPr lang="en-US" sz="800" dirty="0"/>
+              <a:t>Return on Investment</a:t>
+            </a:r>
+          </a:p>
+        </p:txBody>
+      </p:sp>
+      <p:sp>
+        <p:nvSpPr>
+          <p:cNvPr id="20" name="Text Placeholder 12">
+            <a:extLst>
+              <a:ext uri="{FF2B5EF4-FFF2-40B4-BE49-F238E27FC236}">
+                <a16:creationId xmlns:a16="http://schemas.microsoft.com/office/drawing/2014/main" id="{2CAF22A7-4E79-0B47-8A6F-D0933D58CF44}"/>
+              </a:ext>
+            </a:extLst>
+          </p:cNvPr>
+          <p:cNvSpPr>
+            <a:spLocks noGrp="1"/>
+          </p:cNvSpPr>
+          <p:nvPr>
+            <p:ph type="body" sz="quarter" idx="16"/>
+          </p:nvPr>
+        </p:nvSpPr>
+        <p:spPr>
+          <a:xfrm>
+            <a:off x="4559494" y="1474877"/>
+            <a:ext cx="1001626" cy="584667"/>
+          </a:xfrm>
+          <a:ln>
+            <a:solidFill>
+              <a:schemeClr val="accent1">
+                <a:lumMod val="60000"/>
+                <a:lumOff val="40000"/>
+              </a:schemeClr>
+            </a:solidFill>
+          </a:ln>
         </p:spPr>
         <p:txBody>
           <a:bodyPr anchor="ctr">
@@ -880,60 +951,33 @@
       </p:sp>
       <p:sp>
         <p:nvSpPr>
-          <p:cNvPr id="19" name="TextBox 18">
+          <p:cNvPr id="21" name="Text Placeholder 12">
             <a:extLst>
               <a:ext uri="{FF2B5EF4-FFF2-40B4-BE49-F238E27FC236}">
-                <a16:creationId xmlns:a16="http://schemas.microsoft.com/office/drawing/2014/main" id="{A1C797A5-B3D3-5B44-9B35-69FA783DEB68}"/>
+                <a16:creationId xmlns:a16="http://schemas.microsoft.com/office/drawing/2014/main" id="{BFF71F54-59A3-014B-9669-6F401F7A3BD9}"/>
               </a:ext>
             </a:extLst>
           </p:cNvPr>
-          <p:cNvSpPr txBox="1"/>
-          <p:nvPr userDrawn="1"/>
-        </p:nvSpPr>
-        <p:spPr>
-          <a:xfrm>
-            <a:off x="3458985" y="1901877"/>
-            <a:ext cx="1096775" cy="215444"/>
-          </a:xfrm>
-          <a:prstGeom prst="rect">
-            <a:avLst/>
-          </a:prstGeom>
-          <a:noFill/>
-        </p:spPr>
-        <p:txBody>
-          <a:bodyPr wrap="none" rtlCol="0">
-            <a:spAutoFit/>
-          </a:bodyPr>
-          <a:lstStyle/>
-          <a:p>
-            <a:r>
-              <a:rPr lang="en-US" sz="800" dirty="0"/>
-              <a:t>Return on Investment</a:t>
-            </a:r>
-          </a:p>
-        </p:txBody>
-      </p:sp>
-      <p:sp>
-        <p:nvSpPr>
-          <p:cNvPr id="20" name="Text Placeholder 12">
-            <a:extLst>
-              <a:ext uri="{FF2B5EF4-FFF2-40B4-BE49-F238E27FC236}">
-                <a16:creationId xmlns:a16="http://schemas.microsoft.com/office/drawing/2014/main" id="{2CAF22A7-4E79-0B47-8A6F-D0933D58CF44}"/>
-              </a:ext>
-            </a:extLst>
-          </p:cNvPr>
-          <p:cNvSpPr>
-            <a:spLocks noGrp="1"/>
-          </p:cNvSpPr>
-          <p:nvPr>
-            <p:ph type="body" sz="quarter" idx="16"/>
-          </p:nvPr>
-        </p:nvSpPr>
-        <p:spPr>
-          <a:xfrm>
-            <a:off x="4564813" y="1624065"/>
-            <a:ext cx="1001626" cy="277812"/>
-          </a:xfrm>
+          <p:cNvSpPr>
+            <a:spLocks noGrp="1"/>
+          </p:cNvSpPr>
+          <p:nvPr>
+            <p:ph type="body" sz="quarter" idx="17"/>
+          </p:nvPr>
+        </p:nvSpPr>
+        <p:spPr>
+          <a:xfrm>
+            <a:off x="5617575" y="1474877"/>
+            <a:ext cx="1001626" cy="584665"/>
+          </a:xfrm>
+          <a:ln>
+            <a:solidFill>
+              <a:schemeClr val="accent1">
+                <a:lumMod val="60000"/>
+                <a:lumOff val="40000"/>
+              </a:schemeClr>
+            </a:solidFill>
+          </a:ln>
         </p:spPr>
         <p:txBody>
           <a:bodyPr anchor="ctr">
@@ -956,47 +1000,6 @@
       </p:sp>
       <p:sp>
         <p:nvSpPr>
-          <p:cNvPr id="21" name="Text Placeholder 12">
-            <a:extLst>
-              <a:ext uri="{FF2B5EF4-FFF2-40B4-BE49-F238E27FC236}">
-                <a16:creationId xmlns:a16="http://schemas.microsoft.com/office/drawing/2014/main" id="{BFF71F54-59A3-014B-9669-6F401F7A3BD9}"/>
-              </a:ext>
-            </a:extLst>
-          </p:cNvPr>
-          <p:cNvSpPr>
-            <a:spLocks noGrp="1"/>
-          </p:cNvSpPr>
-          <p:nvPr>
-            <p:ph type="body" sz="quarter" idx="17"/>
-          </p:nvPr>
-        </p:nvSpPr>
-        <p:spPr>
-          <a:xfrm>
-            <a:off x="5622894" y="1624065"/>
-            <a:ext cx="1001626" cy="277812"/>
-          </a:xfrm>
-        </p:spPr>
-        <p:txBody>
-          <a:bodyPr anchor="ctr">
-            <a:noAutofit/>
-          </a:bodyPr>
-          <a:lstStyle>
-            <a:lvl1pPr marL="0" indent="0" algn="ctr">
-              <a:buNone/>
-              <a:defRPr sz="1200"/>
-            </a:lvl1pPr>
-          </a:lstStyle>
-          <a:p>
-            <a:pPr lvl="0"/>
-            <a:r>
-              <a:rPr lang="en-US"/>
-              <a:t>Click to edit Master text styles</a:t>
-            </a:r>
-          </a:p>
-        </p:txBody>
-      </p:sp>
-      <p:sp>
-        <p:nvSpPr>
           <p:cNvPr id="22" name="TextBox 21">
             <a:extLst>
               <a:ext uri="{FF2B5EF4-FFF2-40B4-BE49-F238E27FC236}">
@@ -1009,7 +1012,7 @@
         </p:nvSpPr>
         <p:spPr>
           <a:xfrm>
-            <a:off x="4695720" y="1901877"/>
+            <a:off x="4680512" y="2059547"/>
             <a:ext cx="752129" cy="215444"/>
           </a:xfrm>
           <a:prstGeom prst="rect">
@@ -1044,7 +1047,7 @@
         </p:nvSpPr>
         <p:spPr>
           <a:xfrm>
-            <a:off x="5678713" y="1901877"/>
+            <a:off x="5673394" y="2051363"/>
             <a:ext cx="889987" cy="215444"/>
           </a:xfrm>
           <a:prstGeom prst="rect">
@@ -1079,7 +1082,7 @@
         </p:nvSpPr>
         <p:spPr>
           <a:xfrm>
-            <a:off x="3516267" y="2232639"/>
+            <a:off x="3501600" y="2403874"/>
             <a:ext cx="1098378" cy="215444"/>
           </a:xfrm>
           <a:prstGeom prst="rect">
@@ -1114,7 +1117,7 @@
         </p:nvSpPr>
         <p:spPr>
           <a:xfrm>
-            <a:off x="3513504" y="2550679"/>
+            <a:off x="3498837" y="2721914"/>
             <a:ext cx="1197764" cy="215444"/>
           </a:xfrm>
           <a:prstGeom prst="rect">
@@ -1149,7 +1152,7 @@
         </p:nvSpPr>
         <p:spPr>
           <a:xfrm>
-            <a:off x="3506732" y="2868719"/>
+            <a:off x="3492065" y="3039954"/>
             <a:ext cx="1262012" cy="215444"/>
           </a:xfrm>
           <a:prstGeom prst="rect">
@@ -1188,9 +1191,17 @@
         </p:nvSpPr>
         <p:spPr>
           <a:xfrm>
-            <a:off x="4809256" y="2201455"/>
+            <a:off x="4794589" y="2372690"/>
             <a:ext cx="1815263" cy="277812"/>
           </a:xfrm>
+          <a:ln>
+            <a:solidFill>
+              <a:schemeClr val="accent1">
+                <a:lumMod val="60000"/>
+                <a:lumOff val="40000"/>
+              </a:schemeClr>
+            </a:solidFill>
+          </a:ln>
         </p:spPr>
         <p:txBody>
           <a:bodyPr anchor="ctr">
@@ -1229,9 +1240,17 @@
         </p:nvSpPr>
         <p:spPr>
           <a:xfrm>
-            <a:off x="4809256" y="2519495"/>
+            <a:off x="4794589" y="2690730"/>
             <a:ext cx="1815263" cy="277812"/>
           </a:xfrm>
+          <a:ln>
+            <a:solidFill>
+              <a:schemeClr val="accent1">
+                <a:lumMod val="60000"/>
+                <a:lumOff val="40000"/>
+              </a:schemeClr>
+            </a:solidFill>
+          </a:ln>
         </p:spPr>
         <p:txBody>
           <a:bodyPr anchor="ctr">
@@ -1270,9 +1289,17 @@
         </p:nvSpPr>
         <p:spPr>
           <a:xfrm>
-            <a:off x="4809255" y="2833716"/>
+            <a:off x="4794588" y="3004951"/>
             <a:ext cx="1815263" cy="277812"/>
           </a:xfrm>
+          <a:ln>
+            <a:solidFill>
+              <a:schemeClr val="accent1">
+                <a:lumMod val="60000"/>
+                <a:lumOff val="40000"/>
+              </a:schemeClr>
+            </a:solidFill>
+          </a:ln>
         </p:spPr>
         <p:txBody>
           <a:bodyPr anchor="ctr">
@@ -1307,7 +1334,7 @@
         </p:nvSpPr>
         <p:spPr>
           <a:xfrm>
-            <a:off x="3506732" y="3289355"/>
+            <a:off x="3503002" y="3584732"/>
             <a:ext cx="1189428" cy="184666"/>
           </a:xfrm>
           <a:prstGeom prst="rect">
@@ -1346,9 +1373,17 @@
         </p:nvSpPr>
         <p:spPr>
           <a:xfrm>
-            <a:off x="4814577" y="3242782"/>
+            <a:off x="4810847" y="3538159"/>
             <a:ext cx="1815263" cy="277812"/>
           </a:xfrm>
+          <a:ln>
+            <a:solidFill>
+              <a:schemeClr val="accent1">
+                <a:lumMod val="60000"/>
+                <a:lumOff val="40000"/>
+              </a:schemeClr>
+            </a:solidFill>
+          </a:ln>
         </p:spPr>
         <p:txBody>
           <a:bodyPr anchor="ctr">
@@ -1383,8 +1418,8 @@
         </p:nvSpPr>
         <p:spPr>
           <a:xfrm>
-            <a:off x="3506292" y="3575343"/>
-            <a:ext cx="1189428" cy="184666"/>
+            <a:off x="3492065" y="3897879"/>
+            <a:ext cx="421462" cy="184666"/>
           </a:xfrm>
           <a:prstGeom prst="rect">
             <a:avLst/>
@@ -1399,7 +1434,7 @@
           <a:p>
             <a:r>
               <a:rPr lang="en-US" sz="1200" dirty="0"/>
-              <a:t>Line(s) of Business:</a:t>
+              <a:t>States:</a:t>
             </a:r>
           </a:p>
         </p:txBody>
@@ -1422,9 +1457,17 @@
         </p:nvSpPr>
         <p:spPr>
           <a:xfrm>
-            <a:off x="4814137" y="3528770"/>
+            <a:off x="4810407" y="3851306"/>
             <a:ext cx="1815263" cy="277812"/>
           </a:xfrm>
+          <a:ln>
+            <a:solidFill>
+              <a:schemeClr val="accent1">
+                <a:lumMod val="60000"/>
+                <a:lumOff val="40000"/>
+              </a:schemeClr>
+            </a:solidFill>
+          </a:ln>
         </p:spPr>
         <p:txBody>
           <a:bodyPr anchor="ctr">
@@ -1447,41 +1490,6 @@
       </p:sp>
       <p:sp>
         <p:nvSpPr>
-          <p:cNvPr id="51" name="TextBox 50">
-            <a:extLst>
-              <a:ext uri="{FF2B5EF4-FFF2-40B4-BE49-F238E27FC236}">
-                <a16:creationId xmlns:a16="http://schemas.microsoft.com/office/drawing/2014/main" id="{25C8219B-4A02-1643-A319-814975B4BC87}"/>
-              </a:ext>
-            </a:extLst>
-          </p:cNvPr>
-          <p:cNvSpPr txBox="1"/>
-          <p:nvPr userDrawn="1"/>
-        </p:nvSpPr>
-        <p:spPr>
-          <a:xfrm>
-            <a:off x="3511612" y="1179420"/>
-            <a:ext cx="1199656" cy="276999"/>
-          </a:xfrm>
-          <a:prstGeom prst="rect">
-            <a:avLst/>
-          </a:prstGeom>
-          <a:noFill/>
-        </p:spPr>
-        <p:txBody>
-          <a:bodyPr wrap="square" lIns="0" tIns="0" rIns="0" bIns="0" rtlCol="0">
-            <a:spAutoFit/>
-          </a:bodyPr>
-          <a:lstStyle/>
-          <a:p>
-            <a:r>
-              <a:rPr lang="en-US" dirty="0"/>
-              <a:t>Return Type:</a:t>
-            </a:r>
-          </a:p>
-        </p:txBody>
-      </p:sp>
-      <p:sp>
-        <p:nvSpPr>
           <p:cNvPr id="52" name="Text Placeholder 12">
             <a:extLst>
               <a:ext uri="{FF2B5EF4-FFF2-40B4-BE49-F238E27FC236}">
@@ -1498,16 +1506,24 @@
         </p:nvSpPr>
         <p:spPr>
           <a:xfrm>
-            <a:off x="4763863" y="1177521"/>
-            <a:ext cx="1860655" cy="277812"/>
-          </a:xfrm>
-        </p:spPr>
-        <p:txBody>
-          <a:bodyPr>
+            <a:off x="4613990" y="137160"/>
+            <a:ext cx="2011680" cy="274320"/>
+          </a:xfrm>
+          <a:ln>
+            <a:solidFill>
+              <a:schemeClr val="accent1">
+                <a:lumMod val="60000"/>
+                <a:lumOff val="40000"/>
+              </a:schemeClr>
+            </a:solidFill>
+          </a:ln>
+        </p:spPr>
+        <p:txBody>
+          <a:bodyPr lIns="91440" tIns="0" rIns="91440" bIns="0" anchor="ctr">
             <a:noAutofit/>
           </a:bodyPr>
           <a:lstStyle>
-            <a:lvl1pPr marL="0" indent="0">
+            <a:lvl1pPr marL="0" indent="0" algn="ctr">
               <a:buNone/>
               <a:defRPr sz="1800"/>
             </a:lvl1pPr>
@@ -1521,42 +1537,6 @@
           </a:p>
         </p:txBody>
       </p:sp>
-      <p:cxnSp>
-        <p:nvCxnSpPr>
-          <p:cNvPr id="54" name="Straight Connector 53">
-            <a:extLst>
-              <a:ext uri="{FF2B5EF4-FFF2-40B4-BE49-F238E27FC236}">
-                <a16:creationId xmlns:a16="http://schemas.microsoft.com/office/drawing/2014/main" id="{0E380F37-05FD-1B4B-B299-97D3EF3A8FB4}"/>
-              </a:ext>
-            </a:extLst>
-          </p:cNvPr>
-          <p:cNvCxnSpPr/>
-          <p:nvPr userDrawn="1"/>
-        </p:nvCxnSpPr>
-        <p:spPr>
-          <a:xfrm>
-            <a:off x="3506292" y="1509651"/>
-            <a:ext cx="3118226" cy="0"/>
-          </a:xfrm>
-          <a:prstGeom prst="line">
-            <a:avLst/>
-          </a:prstGeom>
-        </p:spPr>
-        <p:style>
-          <a:lnRef idx="1">
-            <a:schemeClr val="accent1"/>
-          </a:lnRef>
-          <a:fillRef idx="0">
-            <a:schemeClr val="accent1"/>
-          </a:fillRef>
-          <a:effectRef idx="0">
-            <a:schemeClr val="accent1"/>
-          </a:effectRef>
-          <a:fontRef idx="minor">
-            <a:schemeClr val="tx1"/>
-          </a:fontRef>
-        </p:style>
-      </p:cxnSp>
       <p:cxnSp>
         <p:nvCxnSpPr>
           <p:cNvPr id="55" name="Straight Connector 54">
@@ -1571,8 +1551,8 @@
         </p:nvCxnSpPr>
         <p:spPr>
           <a:xfrm>
-            <a:off x="3506292" y="2144480"/>
-            <a:ext cx="3118226" cy="0"/>
+            <a:off x="3469841" y="2266814"/>
+            <a:ext cx="3200400" cy="0"/>
           </a:xfrm>
           <a:prstGeom prst="line">
             <a:avLst/>
@@ -1607,8 +1587,228 @@
         </p:nvCxnSpPr>
         <p:spPr>
           <a:xfrm>
-            <a:off x="3506292" y="3174899"/>
-            <a:ext cx="3118226" cy="0"/>
+            <a:off x="3480043" y="3417329"/>
+            <a:ext cx="3200400" cy="0"/>
+          </a:xfrm>
+          <a:prstGeom prst="line">
+            <a:avLst/>
+          </a:prstGeom>
+        </p:spPr>
+        <p:style>
+          <a:lnRef idx="1">
+            <a:schemeClr val="accent1"/>
+          </a:lnRef>
+          <a:fillRef idx="0">
+            <a:schemeClr val="accent1"/>
+          </a:fillRef>
+          <a:effectRef idx="0">
+            <a:schemeClr val="accent1"/>
+          </a:effectRef>
+          <a:fontRef idx="minor">
+            <a:schemeClr val="tx1"/>
+          </a:fontRef>
+        </p:style>
+      </p:cxnSp>
+      <p:sp>
+        <p:nvSpPr>
+          <p:cNvPr id="59" name="Title 58">
+            <a:extLst>
+              <a:ext uri="{FF2B5EF4-FFF2-40B4-BE49-F238E27FC236}">
+                <a16:creationId xmlns:a16="http://schemas.microsoft.com/office/drawing/2014/main" id="{C2DFE595-E7EE-2246-BF46-4D09947A0699}"/>
+              </a:ext>
+            </a:extLst>
+          </p:cNvPr>
+          <p:cNvSpPr>
+            <a:spLocks noGrp="1"/>
+          </p:cNvSpPr>
+          <p:nvPr>
+            <p:ph type="title"/>
+          </p:nvPr>
+        </p:nvSpPr>
+        <p:spPr>
+          <a:xfrm>
+            <a:off x="919723" y="576831"/>
+            <a:ext cx="5715000" cy="457200"/>
+          </a:xfrm>
+        </p:spPr>
+        <p:txBody>
+          <a:bodyPr/>
+          <a:lstStyle/>
+          <a:p>
+            <a:r>
+              <a:rPr lang="en-US"/>
+              <a:t>Click to edit Master title style</a:t>
+            </a:r>
+          </a:p>
+        </p:txBody>
+      </p:sp>
+      <p:pic>
+        <p:nvPicPr>
+          <p:cNvPr id="87" name="Picture 86" descr="A picture containing vector graphics&#10;&#10;Description automatically generated">
+            <a:extLst>
+              <a:ext uri="{FF2B5EF4-FFF2-40B4-BE49-F238E27FC236}">
+                <a16:creationId xmlns:a16="http://schemas.microsoft.com/office/drawing/2014/main" id="{193CBE12-180E-BC43-83E6-3C438BC0DAD3}"/>
+              </a:ext>
+            </a:extLst>
+          </p:cNvPr>
+          <p:cNvPicPr>
+            <a:picLocks noChangeAspect="1"/>
+          </p:cNvPicPr>
+          <p:nvPr userDrawn="1"/>
+        </p:nvPicPr>
+        <p:blipFill>
+          <a:blip r:embed="rId2"/>
+          <a:stretch>
+            <a:fillRect/>
+          </a:stretch>
+        </p:blipFill>
+        <p:spPr>
+          <a:xfrm>
+            <a:off x="233922" y="576831"/>
+            <a:ext cx="457200" cy="457200"/>
+          </a:xfrm>
+          <a:prstGeom prst="rect">
+            <a:avLst/>
+          </a:prstGeom>
+        </p:spPr>
+      </p:pic>
+      <p:sp>
+        <p:nvSpPr>
+          <p:cNvPr id="88" name="TextBox 87">
+            <a:extLst>
+              <a:ext uri="{FF2B5EF4-FFF2-40B4-BE49-F238E27FC236}">
+                <a16:creationId xmlns:a16="http://schemas.microsoft.com/office/drawing/2014/main" id="{7CF9F0B9-21D7-C34D-A37E-1AC9869E2DAD}"/>
+              </a:ext>
+            </a:extLst>
+          </p:cNvPr>
+          <p:cNvSpPr txBox="1"/>
+          <p:nvPr userDrawn="1"/>
+        </p:nvSpPr>
+        <p:spPr>
+          <a:xfrm>
+            <a:off x="4631057" y="1982"/>
+            <a:ext cx="1828800" cy="169277"/>
+          </a:xfrm>
+          <a:prstGeom prst="rect">
+            <a:avLst/>
+          </a:prstGeom>
+          <a:noFill/>
+        </p:spPr>
+        <p:txBody>
+          <a:bodyPr wrap="square" lIns="0" tIns="0" rIns="0" bIns="0" rtlCol="0">
+            <a:noAutofit/>
+          </a:bodyPr>
+          <a:lstStyle/>
+          <a:p>
+            <a:r>
+              <a:rPr lang="en-US" sz="1100" dirty="0"/>
+              <a:t>Return Type</a:t>
+            </a:r>
+          </a:p>
+        </p:txBody>
+      </p:sp>
+      <p:sp>
+        <p:nvSpPr>
+          <p:cNvPr id="89" name="TextBox 88">
+            <a:extLst>
+              <a:ext uri="{FF2B5EF4-FFF2-40B4-BE49-F238E27FC236}">
+                <a16:creationId xmlns:a16="http://schemas.microsoft.com/office/drawing/2014/main" id="{C5EB53A7-8756-9B4F-A8C3-F9CBD8E326D6}"/>
+              </a:ext>
+            </a:extLst>
+          </p:cNvPr>
+          <p:cNvSpPr txBox="1"/>
+          <p:nvPr userDrawn="1"/>
+        </p:nvSpPr>
+        <p:spPr>
+          <a:xfrm>
+            <a:off x="233922" y="-20017"/>
+            <a:ext cx="1828800" cy="169277"/>
+          </a:xfrm>
+          <a:prstGeom prst="rect">
+            <a:avLst/>
+          </a:prstGeom>
+          <a:noFill/>
+        </p:spPr>
+        <p:txBody>
+          <a:bodyPr wrap="square" lIns="0" tIns="0" rIns="0" bIns="0" rtlCol="0">
+            <a:noAutofit/>
+          </a:bodyPr>
+          <a:lstStyle/>
+          <a:p>
+            <a:r>
+              <a:rPr lang="en-US" sz="1100" dirty="0"/>
+              <a:t>Sponsoring Department</a:t>
+            </a:r>
+          </a:p>
+        </p:txBody>
+      </p:sp>
+      <p:sp>
+        <p:nvSpPr>
+          <p:cNvPr id="90" name="Text Placeholder 12">
+            <a:extLst>
+              <a:ext uri="{FF2B5EF4-FFF2-40B4-BE49-F238E27FC236}">
+                <a16:creationId xmlns:a16="http://schemas.microsoft.com/office/drawing/2014/main" id="{46FB2E09-EB9E-D040-8C24-FC516454F0E7}"/>
+              </a:ext>
+            </a:extLst>
+          </p:cNvPr>
+          <p:cNvSpPr>
+            <a:spLocks noGrp="1"/>
+          </p:cNvSpPr>
+          <p:nvPr>
+            <p:ph type="body" sz="quarter" idx="24"/>
+          </p:nvPr>
+        </p:nvSpPr>
+        <p:spPr>
+          <a:xfrm>
+            <a:off x="228600" y="137160"/>
+            <a:ext cx="2011680" cy="274320"/>
+          </a:xfrm>
+          <a:ln>
+            <a:solidFill>
+              <a:schemeClr val="accent1">
+                <a:lumMod val="60000"/>
+                <a:lumOff val="40000"/>
+              </a:schemeClr>
+            </a:solidFill>
+          </a:ln>
+        </p:spPr>
+        <p:txBody>
+          <a:bodyPr lIns="91440" tIns="0" rIns="91440" bIns="0" anchor="ctr">
+            <a:noAutofit/>
+          </a:bodyPr>
+          <a:lstStyle>
+            <a:lvl1pPr marL="0" indent="0" algn="ctr">
+              <a:buNone/>
+              <a:defRPr sz="1800"/>
+            </a:lvl1pPr>
+          </a:lstStyle>
+          <a:p>
+            <a:pPr lvl="0"/>
+            <a:r>
+              <a:rPr lang="en-US"/>
+              <a:t>Click to edit Master text styles</a:t>
+            </a:r>
+          </a:p>
+        </p:txBody>
+      </p:sp>
+      <p:cxnSp>
+        <p:nvCxnSpPr>
+          <p:cNvPr id="92" name="Straight Connector 91">
+            <a:extLst>
+              <a:ext uri="{FF2B5EF4-FFF2-40B4-BE49-F238E27FC236}">
+                <a16:creationId xmlns:a16="http://schemas.microsoft.com/office/drawing/2014/main" id="{8E8E24C9-1E79-FD43-AF3C-F82BE5C9289A}"/>
+              </a:ext>
+            </a:extLst>
+          </p:cNvPr>
+          <p:cNvCxnSpPr>
+            <a:cxnSpLocks/>
+          </p:cNvCxnSpPr>
+          <p:nvPr userDrawn="1"/>
+        </p:nvCxnSpPr>
+        <p:spPr>
+          <a:xfrm>
+            <a:off x="228600" y="4266851"/>
+            <a:ext cx="6406123" cy="0"/>
           </a:xfrm>
           <a:prstGeom prst="line">
             <a:avLst/>
@@ -3207,7 +3407,7 @@
 </file>
 
 <file path=ppt/slides/slide1.xml><?xml version="1.0" encoding="utf-8"?>
-<p:sld xmlns:a="http://schemas.openxmlformats.org/drawingml/2006/main" xmlns:p="http://schemas.openxmlformats.org/presentationml/2006/main" xmlns:r="http://schemas.openxmlformats.org/officeDocument/2006/relationships">
+<p:sld xmlns:a="http://schemas.openxmlformats.org/drawingml/2006/main" xmlns:r="http://schemas.openxmlformats.org/officeDocument/2006/relationships" xmlns:p="http://schemas.openxmlformats.org/presentationml/2006/main">
   <p:cSld>
     <p:spTree>
       <p:nvGrpSpPr>
@@ -3215,7 +3415,14 @@
         <p:cNvGrpSpPr/>
         <p:nvPr/>
       </p:nvGrpSpPr>
-      <p:grpSpPr/>
+      <p:grpSpPr>
+        <a:xfrm>
+          <a:off x="0" y="0"/>
+          <a:ext cx="0" cy="0"/>
+          <a:chOff x="0" y="0"/>
+          <a:chExt cx="0" cy="0"/>
+        </a:xfrm>
+      </p:grpSpPr>
       <p:sp>
         <p:nvSpPr>
           <p:cNvPr id="2" name="Title 1"/>
@@ -3232,7 +3439,7 @@
           <a:lstStyle/>
           <a:p>
             <a:r>
-              <a:t>Title for Layout 0</a:t>
+              <a:t>Project Approvals</a:t>
             </a:r>
           </a:p>
         </p:txBody>
@@ -3253,7 +3460,7 @@
           <a:lstStyle/>
           <a:p>
             <a:r>
-              <a:t>Placeholder index:1 type:Subtitle 2</a:t>
+              <a:t>Created on 08-25-2019</a:t>
             </a:r>
           </a:p>
         </p:txBody>
@@ -3267,7 +3474,7 @@
 </file>
 
 <file path=ppt/slides/slide2.xml><?xml version="1.0" encoding="utf-8"?>
-<p:sld xmlns:a="http://schemas.openxmlformats.org/drawingml/2006/main" xmlns:p="http://schemas.openxmlformats.org/presentationml/2006/main" xmlns:r="http://schemas.openxmlformats.org/officeDocument/2006/relationships">
+<p:sld xmlns:a="http://schemas.openxmlformats.org/drawingml/2006/main" xmlns:r="http://schemas.openxmlformats.org/officeDocument/2006/relationships" xmlns:p="http://schemas.openxmlformats.org/presentationml/2006/main">
   <p:cSld>
     <p:spTree>
       <p:nvGrpSpPr>
@@ -3275,10 +3482,283 @@
         <p:cNvGrpSpPr/>
         <p:nvPr/>
       </p:nvGrpSpPr>
-      <p:grpSpPr/>
-      <p:sp>
-        <p:nvSpPr>
-          <p:cNvPr id="2" name="Title 1"/>
+      <p:grpSpPr>
+        <a:xfrm>
+          <a:off x="0" y="0"/>
+          <a:ext cx="0" cy="0"/>
+          <a:chOff x="0" y="0"/>
+          <a:chExt cx="0" cy="0"/>
+        </a:xfrm>
+      </p:grpSpPr>
+      <p:sp>
+        <p:nvSpPr>
+          <p:cNvPr id="2" name="Content Placeholder 1"/>
+          <p:cNvSpPr>
+            <a:spLocks noGrp="1"/>
+          </p:cNvSpPr>
+          <p:nvPr>
+            <p:ph idx="1"/>
+          </p:nvPr>
+        </p:nvSpPr>
+        <p:spPr/>
+        <p:txBody>
+          <a:bodyPr/>
+          <a:lstStyle/>
+          <a:p>
+            <a:r>
+              <a:t>Phase 3: Work needs to be done by the CXI Team – Due: before full go live_x000D_</a:t>
+            </a:r>
+          </a:p>
+          <a:p>
+            <a:r>
+              <a:t>_x000D_</a:t>
+            </a:r>
+          </a:p>
+          <a:p>
+            <a:r>
+              <a:t>Problem: administrative level agents can make changes in the AA interface; if they update email, first or last name that information is not carried to PC_x000D_</a:t>
+            </a:r>
+          </a:p>
+          <a:p>
+            <a:r>
+              <a:t>The bridge to consume from the staging table is there – but no way to get those specific changes from AA to the table; options exist:_x000D_</a:t>
+            </a:r>
+          </a:p>
+          <a:p>
+            <a:r>
+              <a:t>* Have a create time on the table, run SQL at EOD – might have a 24 hour delay for changes_x000D_</a:t>
+            </a:r>
+          </a:p>
+          <a:p>
+            <a:r>
+              <a:t>* Service call from AA WCF layer isn’t too complex; M can give us endpoints and how it can be handled (preferred)_x000D_</a:t>
+            </a:r>
+          </a:p>
+          <a:p>
+            <a:r>
+              <a:t>** AA pushes to 3 places already – this would just be adding a 4th_x000D_</a:t>
+            </a:r>
+          </a:p>
+          <a:p>
+            <a:r>
+              <a:t>_x000D_</a:t>
+            </a:r>
+          </a:p>
+          <a:p>
+            <a:r>
+              <a:t>Challenge: getting an AA environment set up/access to it_x000D_</a:t>
+            </a:r>
+          </a:p>
+          <a:p>
+            <a:r>
+              <a:t>Short-term work around: run SQL daily to identify any updates and manually update changes in PC (not preferred but possible)</a:t>
+            </a:r>
+          </a:p>
+        </p:txBody>
+      </p:sp>
+      <p:sp>
+        <p:nvSpPr>
+          <p:cNvPr id="3" name="Text Placeholder 2"/>
+          <p:cNvSpPr>
+            <a:spLocks noGrp="1"/>
+          </p:cNvSpPr>
+          <p:nvPr>
+            <p:ph type="body" sz="quarter" idx="14"/>
+          </p:nvPr>
+        </p:nvSpPr>
+        <p:spPr/>
+        <p:txBody>
+          <a:bodyPr/>
+          <a:lstStyle/>
+          <a:p>
+            <a:r>
+              <a:t>New Request</a:t>
+            </a:r>
+          </a:p>
+        </p:txBody>
+      </p:sp>
+      <p:sp>
+        <p:nvSpPr>
+          <p:cNvPr id="4" name="Text Placeholder 3"/>
+          <p:cNvSpPr>
+            <a:spLocks noGrp="1"/>
+          </p:cNvSpPr>
+          <p:nvPr>
+            <p:ph type="body" sz="quarter" idx="15"/>
+          </p:nvPr>
+        </p:nvSpPr>
+        <p:spPr/>
+        <p:txBody>
+          <a:bodyPr/>
+          <a:lstStyle/>
+          <a:p>
+            <a:r>
+              <a:t>0</a:t>
+            </a:r>
+          </a:p>
+        </p:txBody>
+      </p:sp>
+      <p:sp>
+        <p:nvSpPr>
+          <p:cNvPr id="5" name="Text Placeholder 4"/>
+          <p:cNvSpPr>
+            <a:spLocks noGrp="1"/>
+          </p:cNvSpPr>
+          <p:nvPr>
+            <p:ph type="body" sz="quarter" idx="16"/>
+          </p:nvPr>
+        </p:nvSpPr>
+        <p:spPr/>
+        <p:txBody>
+          <a:bodyPr/>
+          <a:lstStyle/>
+          <a:p>
+            <a:r>
+              <a:t>0</a:t>
+            </a:r>
+          </a:p>
+        </p:txBody>
+      </p:sp>
+      <p:sp>
+        <p:nvSpPr>
+          <p:cNvPr id="6" name="Text Placeholder 5"/>
+          <p:cNvSpPr>
+            <a:spLocks noGrp="1"/>
+          </p:cNvSpPr>
+          <p:nvPr>
+            <p:ph type="body" sz="quarter" idx="17"/>
+          </p:nvPr>
+        </p:nvSpPr>
+        <p:spPr/>
+        <p:txBody>
+          <a:bodyPr/>
+          <a:lstStyle/>
+          <a:p>
+            <a:r>
+              <a:t>0</a:t>
+            </a:r>
+          </a:p>
+        </p:txBody>
+      </p:sp>
+      <p:sp>
+        <p:nvSpPr>
+          <p:cNvPr id="7" name="Text Placeholder 6"/>
+          <p:cNvSpPr>
+            <a:spLocks noGrp="1"/>
+          </p:cNvSpPr>
+          <p:nvPr>
+            <p:ph type="body" sz="quarter" idx="18"/>
+          </p:nvPr>
+        </p:nvSpPr>
+        <p:spPr/>
+        <p:txBody>
+          <a:bodyPr/>
+          <a:lstStyle/>
+          <a:p>
+            <a:endParaRPr/>
+          </a:p>
+        </p:txBody>
+      </p:sp>
+      <p:sp>
+        <p:nvSpPr>
+          <p:cNvPr id="8" name="Text Placeholder 7"/>
+          <p:cNvSpPr>
+            <a:spLocks noGrp="1"/>
+          </p:cNvSpPr>
+          <p:nvPr>
+            <p:ph type="body" sz="quarter" idx="19"/>
+          </p:nvPr>
+        </p:nvSpPr>
+        <p:spPr/>
+        <p:txBody>
+          <a:bodyPr/>
+          <a:lstStyle/>
+          <a:p>
+            <a:endParaRPr/>
+          </a:p>
+        </p:txBody>
+      </p:sp>
+      <p:sp>
+        <p:nvSpPr>
+          <p:cNvPr id="9" name="Text Placeholder 8"/>
+          <p:cNvSpPr>
+            <a:spLocks noGrp="1"/>
+          </p:cNvSpPr>
+          <p:nvPr>
+            <p:ph type="body" sz="quarter" idx="20"/>
+          </p:nvPr>
+        </p:nvSpPr>
+        <p:spPr/>
+        <p:txBody>
+          <a:bodyPr/>
+          <a:lstStyle/>
+          <a:p>
+            <a:endParaRPr/>
+          </a:p>
+        </p:txBody>
+      </p:sp>
+      <p:sp>
+        <p:nvSpPr>
+          <p:cNvPr id="10" name="Text Placeholder 9"/>
+          <p:cNvSpPr>
+            <a:spLocks noGrp="1"/>
+          </p:cNvSpPr>
+          <p:nvPr>
+            <p:ph type="body" sz="quarter" idx="21"/>
+          </p:nvPr>
+        </p:nvSpPr>
+        <p:spPr/>
+        <p:txBody>
+          <a:bodyPr/>
+          <a:lstStyle/>
+          <a:p>
+            <a:endParaRPr/>
+          </a:p>
+        </p:txBody>
+      </p:sp>
+      <p:sp>
+        <p:nvSpPr>
+          <p:cNvPr id="11" name="Text Placeholder 10"/>
+          <p:cNvSpPr>
+            <a:spLocks noGrp="1"/>
+          </p:cNvSpPr>
+          <p:nvPr>
+            <p:ph type="body" sz="quarter" idx="22"/>
+          </p:nvPr>
+        </p:nvSpPr>
+        <p:spPr/>
+        <p:txBody>
+          <a:bodyPr/>
+          <a:lstStyle/>
+          <a:p>
+            <a:endParaRPr/>
+          </a:p>
+        </p:txBody>
+      </p:sp>
+      <p:sp>
+        <p:nvSpPr>
+          <p:cNvPr id="12" name="Text Placeholder 11"/>
+          <p:cNvSpPr>
+            <a:spLocks noGrp="1"/>
+          </p:cNvSpPr>
+          <p:nvPr>
+            <p:ph type="body" sz="quarter" idx="23"/>
+          </p:nvPr>
+        </p:nvSpPr>
+        <p:spPr/>
+        <p:txBody>
+          <a:bodyPr/>
+          <a:lstStyle/>
+          <a:p>
+            <a:r>
+              <a:t>0</a:t>
+            </a:r>
+          </a:p>
+        </p:txBody>
+      </p:sp>
+      <p:sp>
+        <p:nvSpPr>
+          <p:cNvPr id="13" name="Title 12"/>
           <p:cNvSpPr>
             <a:spLocks noGrp="1"/>
           </p:cNvSpPr>
@@ -3292,19 +3772,19 @@
           <a:lstStyle/>
           <a:p>
             <a:r>
-              <a:t>Title for Layout 1</a:t>
-            </a:r>
-          </a:p>
-        </p:txBody>
-      </p:sp>
-      <p:sp>
-        <p:nvSpPr>
-          <p:cNvPr id="3" name="Content Placeholder 2"/>
-          <p:cNvSpPr>
-            <a:spLocks noGrp="1"/>
-          </p:cNvSpPr>
-          <p:nvPr>
-            <p:ph idx="1"/>
+              <a:t>Agency Admin Replacement - Phase 3 - PE Go Live</a:t>
+            </a:r>
+          </a:p>
+        </p:txBody>
+      </p:sp>
+      <p:sp>
+        <p:nvSpPr>
+          <p:cNvPr id="14" name="Text Placeholder 13"/>
+          <p:cNvSpPr>
+            <a:spLocks noGrp="1"/>
+          </p:cNvSpPr>
+          <p:nvPr>
+            <p:ph type="body" sz="quarter" idx="24"/>
           </p:nvPr>
         </p:nvSpPr>
         <p:spPr/>
@@ -3313,598 +3793,7 @@
           <a:lstStyle/>
           <a:p>
             <a:r>
-              <a:t>Placeholder index:1 type:Content Placeholder 2</a:t>
-            </a:r>
-          </a:p>
-        </p:txBody>
-      </p:sp>
-    </p:spTree>
-  </p:cSld>
-  <p:clrMapOvr>
-    <a:masterClrMapping/>
-  </p:clrMapOvr>
-</p:sld>
-</file>
-
-<file path=ppt/slides/slide3.xml><?xml version="1.0" encoding="utf-8"?>
-<p:sld xmlns:a="http://schemas.openxmlformats.org/drawingml/2006/main" xmlns:p="http://schemas.openxmlformats.org/presentationml/2006/main" xmlns:r="http://schemas.openxmlformats.org/officeDocument/2006/relationships">
-  <p:cSld>
-    <p:spTree>
-      <p:nvGrpSpPr>
-        <p:cNvPr id="1" name=""/>
-        <p:cNvGrpSpPr/>
-        <p:nvPr/>
-      </p:nvGrpSpPr>
-      <p:grpSpPr/>
-      <p:sp>
-        <p:nvSpPr>
-          <p:cNvPr id="2" name="Title 1"/>
-          <p:cNvSpPr>
-            <a:spLocks noGrp="1"/>
-          </p:cNvSpPr>
-          <p:nvPr>
-            <p:ph type="title"/>
-          </p:nvPr>
-        </p:nvSpPr>
-        <p:spPr/>
-        <p:txBody>
-          <a:bodyPr/>
-          <a:lstStyle/>
-          <a:p>
-            <a:r>
-              <a:t>Title for Layout 2</a:t>
-            </a:r>
-          </a:p>
-        </p:txBody>
-      </p:sp>
-      <p:sp>
-        <p:nvSpPr>
-          <p:cNvPr id="3" name="Content Placeholder 2"/>
-          <p:cNvSpPr>
-            <a:spLocks noGrp="1"/>
-          </p:cNvSpPr>
-          <p:nvPr>
-            <p:ph idx="1"/>
-          </p:nvPr>
-        </p:nvSpPr>
-        <p:spPr/>
-        <p:txBody>
-          <a:bodyPr/>
-          <a:lstStyle/>
-          <a:p>
-            <a:r>
-              <a:t>Placeholder index:1 type:Content Placeholder 2</a:t>
-            </a:r>
-          </a:p>
-        </p:txBody>
-      </p:sp>
-      <p:sp>
-        <p:nvSpPr>
-          <p:cNvPr id="4" name="Text Placeholder 3"/>
-          <p:cNvSpPr>
-            <a:spLocks noGrp="1"/>
-          </p:cNvSpPr>
-          <p:nvPr>
-            <p:ph type="body" idx="14" sz="quarter"/>
-          </p:nvPr>
-        </p:nvSpPr>
-        <p:spPr/>
-        <p:txBody>
-          <a:bodyPr/>
-          <a:lstStyle/>
-          <a:p>
-            <a:r>
-              <a:t>Placeholder index:14 type:Text Placeholder 3</a:t>
-            </a:r>
-          </a:p>
-        </p:txBody>
-      </p:sp>
-      <p:sp>
-        <p:nvSpPr>
-          <p:cNvPr id="5" name="Text Placeholder 4"/>
-          <p:cNvSpPr>
-            <a:spLocks noGrp="1"/>
-          </p:cNvSpPr>
-          <p:nvPr>
-            <p:ph type="body" idx="15" sz="quarter"/>
-          </p:nvPr>
-        </p:nvSpPr>
-        <p:spPr/>
-        <p:txBody>
-          <a:bodyPr/>
-          <a:lstStyle/>
-          <a:p>
-            <a:r>
-              <a:t>Placeholder index:15 type:Text Placeholder 4</a:t>
-            </a:r>
-          </a:p>
-        </p:txBody>
-      </p:sp>
-      <p:sp>
-        <p:nvSpPr>
-          <p:cNvPr id="6" name="Text Placeholder 5"/>
-          <p:cNvSpPr>
-            <a:spLocks noGrp="1"/>
-          </p:cNvSpPr>
-          <p:nvPr>
-            <p:ph type="body" idx="16" sz="quarter"/>
-          </p:nvPr>
-        </p:nvSpPr>
-        <p:spPr/>
-        <p:txBody>
-          <a:bodyPr/>
-          <a:lstStyle/>
-          <a:p>
-            <a:r>
-              <a:t>Placeholder index:16 type:Text Placeholder 5</a:t>
-            </a:r>
-          </a:p>
-        </p:txBody>
-      </p:sp>
-      <p:sp>
-        <p:nvSpPr>
-          <p:cNvPr id="7" name="Text Placeholder 6"/>
-          <p:cNvSpPr>
-            <a:spLocks noGrp="1"/>
-          </p:cNvSpPr>
-          <p:nvPr>
-            <p:ph type="body" idx="17" sz="quarter"/>
-          </p:nvPr>
-        </p:nvSpPr>
-        <p:spPr/>
-        <p:txBody>
-          <a:bodyPr/>
-          <a:lstStyle/>
-          <a:p>
-            <a:r>
-              <a:t>Placeholder index:17 type:Text Placeholder 6</a:t>
-            </a:r>
-          </a:p>
-        </p:txBody>
-      </p:sp>
-      <p:sp>
-        <p:nvSpPr>
-          <p:cNvPr id="8" name="Text Placeholder 7"/>
-          <p:cNvSpPr>
-            <a:spLocks noGrp="1"/>
-          </p:cNvSpPr>
-          <p:nvPr>
-            <p:ph type="body" idx="18" sz="quarter"/>
-          </p:nvPr>
-        </p:nvSpPr>
-        <p:spPr/>
-        <p:txBody>
-          <a:bodyPr/>
-          <a:lstStyle/>
-          <a:p>
-            <a:r>
-              <a:t>Placeholder index:18 type:Text Placeholder 7</a:t>
-            </a:r>
-          </a:p>
-        </p:txBody>
-      </p:sp>
-      <p:sp>
-        <p:nvSpPr>
-          <p:cNvPr id="9" name="Text Placeholder 8"/>
-          <p:cNvSpPr>
-            <a:spLocks noGrp="1"/>
-          </p:cNvSpPr>
-          <p:nvPr>
-            <p:ph type="body" idx="19" sz="quarter"/>
-          </p:nvPr>
-        </p:nvSpPr>
-        <p:spPr/>
-        <p:txBody>
-          <a:bodyPr/>
-          <a:lstStyle/>
-          <a:p>
-            <a:r>
-              <a:t>Placeholder index:19 type:Text Placeholder 8</a:t>
-            </a:r>
-          </a:p>
-        </p:txBody>
-      </p:sp>
-      <p:sp>
-        <p:nvSpPr>
-          <p:cNvPr id="10" name="Text Placeholder 9"/>
-          <p:cNvSpPr>
-            <a:spLocks noGrp="1"/>
-          </p:cNvSpPr>
-          <p:nvPr>
-            <p:ph type="body" idx="20" sz="quarter"/>
-          </p:nvPr>
-        </p:nvSpPr>
-        <p:spPr/>
-        <p:txBody>
-          <a:bodyPr/>
-          <a:lstStyle/>
-          <a:p>
-            <a:r>
-              <a:t>Placeholder index:20 type:Text Placeholder 9</a:t>
-            </a:r>
-          </a:p>
-        </p:txBody>
-      </p:sp>
-      <p:sp>
-        <p:nvSpPr>
-          <p:cNvPr id="11" name="Text Placeholder 10"/>
-          <p:cNvSpPr>
-            <a:spLocks noGrp="1"/>
-          </p:cNvSpPr>
-          <p:nvPr>
-            <p:ph type="body" idx="21" sz="quarter"/>
-          </p:nvPr>
-        </p:nvSpPr>
-        <p:spPr/>
-        <p:txBody>
-          <a:bodyPr/>
-          <a:lstStyle/>
-          <a:p>
-            <a:r>
-              <a:t>Placeholder index:21 type:Text Placeholder 10</a:t>
-            </a:r>
-          </a:p>
-        </p:txBody>
-      </p:sp>
-      <p:sp>
-        <p:nvSpPr>
-          <p:cNvPr id="12" name="Text Placeholder 11"/>
-          <p:cNvSpPr>
-            <a:spLocks noGrp="1"/>
-          </p:cNvSpPr>
-          <p:nvPr>
-            <p:ph type="body" idx="22" sz="quarter"/>
-          </p:nvPr>
-        </p:nvSpPr>
-        <p:spPr/>
-        <p:txBody>
-          <a:bodyPr/>
-          <a:lstStyle/>
-          <a:p>
-            <a:r>
-              <a:t>Placeholder index:22 type:Text Placeholder 11</a:t>
-            </a:r>
-          </a:p>
-        </p:txBody>
-      </p:sp>
-      <p:sp>
-        <p:nvSpPr>
-          <p:cNvPr id="13" name="Text Placeholder 12"/>
-          <p:cNvSpPr>
-            <a:spLocks noGrp="1"/>
-          </p:cNvSpPr>
-          <p:nvPr>
-            <p:ph type="body" idx="23" sz="quarter"/>
-          </p:nvPr>
-        </p:nvSpPr>
-        <p:spPr/>
-        <p:txBody>
-          <a:bodyPr/>
-          <a:lstStyle/>
-          <a:p>
-            <a:r>
-              <a:t>Placeholder index:23 type:Text Placeholder 12</a:t>
-            </a:r>
-          </a:p>
-        </p:txBody>
-      </p:sp>
-    </p:spTree>
-  </p:cSld>
-  <p:clrMapOvr>
-    <a:masterClrMapping/>
-  </p:clrMapOvr>
-</p:sld>
-</file>
-
-<file path=ppt/slides/slide4.xml><?xml version="1.0" encoding="utf-8"?>
-<p:sld xmlns:a="http://schemas.openxmlformats.org/drawingml/2006/main" xmlns:p="http://schemas.openxmlformats.org/presentationml/2006/main" xmlns:r="http://schemas.openxmlformats.org/officeDocument/2006/relationships">
-  <p:cSld>
-    <p:spTree>
-      <p:nvGrpSpPr>
-        <p:cNvPr id="1" name=""/>
-        <p:cNvGrpSpPr/>
-        <p:nvPr/>
-      </p:nvGrpSpPr>
-      <p:grpSpPr/>
-      <p:sp>
-        <p:nvSpPr>
-          <p:cNvPr id="2" name="Title 1"/>
-          <p:cNvSpPr>
-            <a:spLocks noGrp="1"/>
-          </p:cNvSpPr>
-          <p:nvPr>
-            <p:ph type="title"/>
-          </p:nvPr>
-        </p:nvSpPr>
-        <p:spPr/>
-        <p:txBody>
-          <a:bodyPr/>
-          <a:lstStyle/>
-          <a:p>
-            <a:r>
-              <a:t>Title for Layout 3</a:t>
-            </a:r>
-          </a:p>
-        </p:txBody>
-      </p:sp>
-      <p:sp>
-        <p:nvSpPr>
-          <p:cNvPr id="3" name="Content Placeholder 2"/>
-          <p:cNvSpPr>
-            <a:spLocks noGrp="1"/>
-          </p:cNvSpPr>
-          <p:nvPr>
-            <p:ph idx="1" sz="half"/>
-          </p:nvPr>
-        </p:nvSpPr>
-        <p:spPr/>
-        <p:txBody>
-          <a:bodyPr/>
-          <a:lstStyle/>
-          <a:p>
-            <a:r>
-              <a:t>Placeholder index:1 type:Content Placeholder 2</a:t>
-            </a:r>
-          </a:p>
-        </p:txBody>
-      </p:sp>
-      <p:sp>
-        <p:nvSpPr>
-          <p:cNvPr id="4" name="Content Placeholder 3"/>
-          <p:cNvSpPr>
-            <a:spLocks noGrp="1"/>
-          </p:cNvSpPr>
-          <p:nvPr>
-            <p:ph idx="2" sz="half"/>
-          </p:nvPr>
-        </p:nvSpPr>
-        <p:spPr/>
-        <p:txBody>
-          <a:bodyPr/>
-          <a:lstStyle/>
-          <a:p>
-            <a:r>
-              <a:t>Placeholder index:2 type:Content Placeholder 3</a:t>
-            </a:r>
-          </a:p>
-        </p:txBody>
-      </p:sp>
-    </p:spTree>
-  </p:cSld>
-  <p:clrMapOvr>
-    <a:masterClrMapping/>
-  </p:clrMapOvr>
-</p:sld>
-</file>
-
-<file path=ppt/slides/slide5.xml><?xml version="1.0" encoding="utf-8"?>
-<p:sld xmlns:a="http://schemas.openxmlformats.org/drawingml/2006/main" xmlns:p="http://schemas.openxmlformats.org/presentationml/2006/main" xmlns:r="http://schemas.openxmlformats.org/officeDocument/2006/relationships">
-  <p:cSld>
-    <p:spTree>
-      <p:nvGrpSpPr>
-        <p:cNvPr id="1" name=""/>
-        <p:cNvGrpSpPr/>
-        <p:nvPr/>
-      </p:nvGrpSpPr>
-      <p:grpSpPr/>
-      <p:sp>
-        <p:nvSpPr>
-          <p:cNvPr id="2" name="Title 1"/>
-          <p:cNvSpPr>
-            <a:spLocks noGrp="1"/>
-          </p:cNvSpPr>
-          <p:nvPr>
-            <p:ph type="title"/>
-          </p:nvPr>
-        </p:nvSpPr>
-        <p:spPr/>
-        <p:txBody>
-          <a:bodyPr/>
-          <a:lstStyle/>
-          <a:p>
-            <a:r>
-              <a:t>Title for Layout 4</a:t>
-            </a:r>
-          </a:p>
-        </p:txBody>
-      </p:sp>
-      <p:sp>
-        <p:nvSpPr>
-          <p:cNvPr id="3" name="Text Placeholder 2"/>
-          <p:cNvSpPr>
-            <a:spLocks noGrp="1"/>
-          </p:cNvSpPr>
-          <p:nvPr>
-            <p:ph type="body" idx="1"/>
-          </p:nvPr>
-        </p:nvSpPr>
-        <p:spPr/>
-        <p:txBody>
-          <a:bodyPr/>
-          <a:lstStyle/>
-          <a:p>
-            <a:r>
-              <a:t>Placeholder index:1 type:Text Placeholder 2</a:t>
-            </a:r>
-          </a:p>
-        </p:txBody>
-      </p:sp>
-      <p:sp>
-        <p:nvSpPr>
-          <p:cNvPr id="4" name="Content Placeholder 3"/>
-          <p:cNvSpPr>
-            <a:spLocks noGrp="1"/>
-          </p:cNvSpPr>
-          <p:nvPr>
-            <p:ph idx="2" sz="half"/>
-          </p:nvPr>
-        </p:nvSpPr>
-        <p:spPr/>
-        <p:txBody>
-          <a:bodyPr/>
-          <a:lstStyle/>
-          <a:p>
-            <a:r>
-              <a:t>Placeholder index:2 type:Content Placeholder 3</a:t>
-            </a:r>
-          </a:p>
-        </p:txBody>
-      </p:sp>
-      <p:sp>
-        <p:nvSpPr>
-          <p:cNvPr id="5" name="Text Placeholder 4"/>
-          <p:cNvSpPr>
-            <a:spLocks noGrp="1"/>
-          </p:cNvSpPr>
-          <p:nvPr>
-            <p:ph type="body" idx="3" sz="quarter"/>
-          </p:nvPr>
-        </p:nvSpPr>
-        <p:spPr/>
-        <p:txBody>
-          <a:bodyPr/>
-          <a:lstStyle/>
-          <a:p>
-            <a:r>
-              <a:t>Placeholder index:3 type:Text Placeholder 4</a:t>
-            </a:r>
-          </a:p>
-        </p:txBody>
-      </p:sp>
-      <p:sp>
-        <p:nvSpPr>
-          <p:cNvPr id="6" name="Content Placeholder 5"/>
-          <p:cNvSpPr>
-            <a:spLocks noGrp="1"/>
-          </p:cNvSpPr>
-          <p:nvPr>
-            <p:ph idx="4" sz="quarter"/>
-          </p:nvPr>
-        </p:nvSpPr>
-        <p:spPr/>
-        <p:txBody>
-          <a:bodyPr/>
-          <a:lstStyle/>
-          <a:p>
-            <a:r>
-              <a:t>Placeholder index:4 type:Content Placeholder 5</a:t>
-            </a:r>
-          </a:p>
-        </p:txBody>
-      </p:sp>
-    </p:spTree>
-  </p:cSld>
-  <p:clrMapOvr>
-    <a:masterClrMapping/>
-  </p:clrMapOvr>
-</p:sld>
-</file>
-
-<file path=ppt/slides/slide6.xml><?xml version="1.0" encoding="utf-8"?>
-<p:sld xmlns:a="http://schemas.openxmlformats.org/drawingml/2006/main" xmlns:p="http://schemas.openxmlformats.org/presentationml/2006/main" xmlns:r="http://schemas.openxmlformats.org/officeDocument/2006/relationships">
-  <p:cSld>
-    <p:spTree>
-      <p:nvGrpSpPr>
-        <p:cNvPr id="1" name=""/>
-        <p:cNvGrpSpPr/>
-        <p:nvPr/>
-      </p:nvGrpSpPr>
-      <p:grpSpPr/>
-      <p:sp>
-        <p:nvSpPr>
-          <p:cNvPr id="2" name="Title 1"/>
-          <p:cNvSpPr>
-            <a:spLocks noGrp="1"/>
-          </p:cNvSpPr>
-          <p:nvPr>
-            <p:ph type="title"/>
-          </p:nvPr>
-        </p:nvSpPr>
-        <p:spPr/>
-        <p:txBody>
-          <a:bodyPr/>
-          <a:lstStyle/>
-          <a:p>
-            <a:r>
-              <a:t>Title for Layout 5</a:t>
-            </a:r>
-          </a:p>
-        </p:txBody>
-      </p:sp>
-    </p:spTree>
-  </p:cSld>
-  <p:clrMapOvr>
-    <a:masterClrMapping/>
-  </p:clrMapOvr>
-</p:sld>
-</file>
-
-<file path=ppt/slides/slide7.xml><?xml version="1.0" encoding="utf-8"?>
-<p:sld xmlns:a="http://schemas.openxmlformats.org/drawingml/2006/main" xmlns:p="http://schemas.openxmlformats.org/presentationml/2006/main" xmlns:r="http://schemas.openxmlformats.org/officeDocument/2006/relationships">
-  <p:cSld>
-    <p:spTree>
-      <p:nvGrpSpPr>
-        <p:cNvPr id="1" name=""/>
-        <p:cNvGrpSpPr/>
-        <p:nvPr/>
-      </p:nvGrpSpPr>
-      <p:grpSpPr/>
-    </p:spTree>
-  </p:cSld>
-  <p:clrMapOvr>
-    <a:masterClrMapping/>
-  </p:clrMapOvr>
-</p:sld>
-</file>
-
-<file path=ppt/slides/slide8.xml><?xml version="1.0" encoding="utf-8"?>
-<p:sld xmlns:a="http://schemas.openxmlformats.org/drawingml/2006/main" xmlns:p="http://schemas.openxmlformats.org/presentationml/2006/main" xmlns:r="http://schemas.openxmlformats.org/officeDocument/2006/relationships">
-  <p:cSld>
-    <p:spTree>
-      <p:nvGrpSpPr>
-        <p:cNvPr id="1" name=""/>
-        <p:cNvGrpSpPr/>
-        <p:nvPr/>
-      </p:nvGrpSpPr>
-      <p:grpSpPr/>
-      <p:sp>
-        <p:nvSpPr>
-          <p:cNvPr id="2" name="Vertical Content Placeholder 1"/>
-          <p:cNvSpPr>
-            <a:spLocks noGrp="1"/>
-          </p:cNvSpPr>
-          <p:nvPr>
-            <p:ph idx="13" orient="vert" sz="quarter"/>
-          </p:nvPr>
-        </p:nvSpPr>
-        <p:spPr/>
-        <p:txBody>
-          <a:bodyPr/>
-          <a:lstStyle/>
-          <a:p>
-            <a:r>
-              <a:t>Placeholder index:13 type:Vertical Content Placeholder 1</a:t>
-            </a:r>
-          </a:p>
-        </p:txBody>
-      </p:sp>
-      <p:sp>
-        <p:nvSpPr>
-          <p:cNvPr id="3" name="Title 2"/>
-          <p:cNvSpPr>
-            <a:spLocks noGrp="1"/>
-          </p:cNvSpPr>
-          <p:nvPr>
-            <p:ph type="title"/>
-          </p:nvPr>
-        </p:nvSpPr>
-        <p:spPr/>
-        <p:txBody>
-          <a:bodyPr/>
-          <a:lstStyle/>
-          <a:p>
-            <a:r>
-              <a:t>Title for Layout 7</a:t>
+              <a:t>Insurance Operations</a:t>
             </a:r>
           </a:p>
         </p:txBody>
@@ -4172,7 +4061,7 @@
   <a:extraClrSchemeLst/>
   <a:extLst>
     <a:ext uri="{05A4C25C-085E-4340-85A3-A5531E510DB2}">
-      <thm15:themeFamily xmlns:thm15="http://schemas.microsoft.com/office/thememl/2012/main" name="Project Approval Status Portrait Letter" id="{C3F5C9E6-2A06-D34A-A0C1-39F5C343575D}" vid="{419AB995-F841-A049-89C8-9DF7175D164A}"/>
+      <thm15:themeFamily xmlns:thm15="http://schemas.microsoft.com/office/thememl/2012/main" name="Project Approval Status Portrait Letter" id="{87225FA0-24F5-3A48-95C7-F8FB093C4267}" vid="{05D6E473-3CA2-A440-A4E7-70EB9473FFD3}"/>
     </a:ext>
   </a:extLst>
 </a:theme>

</xml_diff>